<commit_message>
updating. let's see what happens...
</commit_message>
<xml_diff>
--- a/Week 4/Cursor_Lecture_Slides.pptx
+++ b/Week 4/Cursor_Lecture_Slides.pptx
@@ -14,7 +14,6 @@
     <p:sldId id="261" r:id="rId8"/>
     <p:sldId id="259" r:id="rId9"/>
     <p:sldId id="263" r:id="rId10"/>
-    <p:sldId id="265" r:id="rId11"/>
   </p:sldIdLst>
   <p:sldSz cx="12192000" cy="6858000"/>
   <p:notesSz cx="6858000" cy="9144000"/>
@@ -250,7 +249,7 @@
           <a:p>
             <a:fld id="{828A52BA-EE88-42EE-9D24-82249EAB6ED1}" type="datetimeFigureOut">
               <a:rPr lang="en-US" smtClean="0"/>
-              <a:t>2/17/2019</a:t>
+              <a:t>9/9/2020</a:t>
             </a:fld>
             <a:endParaRPr lang="en-US"/>
           </a:p>
@@ -418,7 +417,7 @@
           <a:p>
             <a:fld id="{828A52BA-EE88-42EE-9D24-82249EAB6ED1}" type="datetimeFigureOut">
               <a:rPr lang="en-US" smtClean="0"/>
-              <a:t>2/17/2019</a:t>
+              <a:t>9/9/2020</a:t>
             </a:fld>
             <a:endParaRPr lang="en-US"/>
           </a:p>
@@ -596,7 +595,7 @@
           <a:p>
             <a:fld id="{828A52BA-EE88-42EE-9D24-82249EAB6ED1}" type="datetimeFigureOut">
               <a:rPr lang="en-US" smtClean="0"/>
-              <a:t>2/17/2019</a:t>
+              <a:t>9/9/2020</a:t>
             </a:fld>
             <a:endParaRPr lang="en-US"/>
           </a:p>
@@ -764,7 +763,7 @@
           <a:p>
             <a:fld id="{828A52BA-EE88-42EE-9D24-82249EAB6ED1}" type="datetimeFigureOut">
               <a:rPr lang="en-US" smtClean="0"/>
-              <a:t>2/17/2019</a:t>
+              <a:t>9/9/2020</a:t>
             </a:fld>
             <a:endParaRPr lang="en-US"/>
           </a:p>
@@ -1009,7 +1008,7 @@
           <a:p>
             <a:fld id="{828A52BA-EE88-42EE-9D24-82249EAB6ED1}" type="datetimeFigureOut">
               <a:rPr lang="en-US" smtClean="0"/>
-              <a:t>2/17/2019</a:t>
+              <a:t>9/9/2020</a:t>
             </a:fld>
             <a:endParaRPr lang="en-US"/>
           </a:p>
@@ -1238,7 +1237,7 @@
           <a:p>
             <a:fld id="{828A52BA-EE88-42EE-9D24-82249EAB6ED1}" type="datetimeFigureOut">
               <a:rPr lang="en-US" smtClean="0"/>
-              <a:t>2/17/2019</a:t>
+              <a:t>9/9/2020</a:t>
             </a:fld>
             <a:endParaRPr lang="en-US"/>
           </a:p>
@@ -1602,7 +1601,7 @@
           <a:p>
             <a:fld id="{828A52BA-EE88-42EE-9D24-82249EAB6ED1}" type="datetimeFigureOut">
               <a:rPr lang="en-US" smtClean="0"/>
-              <a:t>2/17/2019</a:t>
+              <a:t>9/9/2020</a:t>
             </a:fld>
             <a:endParaRPr lang="en-US"/>
           </a:p>
@@ -1719,7 +1718,7 @@
           <a:p>
             <a:fld id="{828A52BA-EE88-42EE-9D24-82249EAB6ED1}" type="datetimeFigureOut">
               <a:rPr lang="en-US" smtClean="0"/>
-              <a:t>2/17/2019</a:t>
+              <a:t>9/9/2020</a:t>
             </a:fld>
             <a:endParaRPr lang="en-US"/>
           </a:p>
@@ -1814,7 +1813,7 @@
           <a:p>
             <a:fld id="{828A52BA-EE88-42EE-9D24-82249EAB6ED1}" type="datetimeFigureOut">
               <a:rPr lang="en-US" smtClean="0"/>
-              <a:t>2/17/2019</a:t>
+              <a:t>9/9/2020</a:t>
             </a:fld>
             <a:endParaRPr lang="en-US"/>
           </a:p>
@@ -2089,7 +2088,7 @@
           <a:p>
             <a:fld id="{828A52BA-EE88-42EE-9D24-82249EAB6ED1}" type="datetimeFigureOut">
               <a:rPr lang="en-US" smtClean="0"/>
-              <a:t>2/17/2019</a:t>
+              <a:t>9/9/2020</a:t>
             </a:fld>
             <a:endParaRPr lang="en-US"/>
           </a:p>
@@ -2341,7 +2340,7 @@
           <a:p>
             <a:fld id="{828A52BA-EE88-42EE-9D24-82249EAB6ED1}" type="datetimeFigureOut">
               <a:rPr lang="en-US" smtClean="0"/>
-              <a:t>2/17/2019</a:t>
+              <a:t>9/9/2020</a:t>
             </a:fld>
             <a:endParaRPr lang="en-US"/>
           </a:p>
@@ -2552,7 +2551,7 @@
           <a:p>
             <a:fld id="{828A52BA-EE88-42EE-9D24-82249EAB6ED1}" type="datetimeFigureOut">
               <a:rPr lang="en-US" smtClean="0"/>
-              <a:t>2/17/2019</a:t>
+              <a:t>9/9/2020</a:t>
             </a:fld>
             <a:endParaRPr lang="en-US"/>
           </a:p>
@@ -3008,16 +3007,16 @@
           <a:p>
             <a:r>
               <a:rPr lang="en-US" dirty="0"/>
+              <a:t>Homework Solutions</a:t>
+            </a:r>
+          </a:p>
+          <a:p>
+            <a:endParaRPr lang="en-US" dirty="0"/>
+          </a:p>
+          <a:p>
+            <a:r>
+              <a:rPr lang="en-US" dirty="0"/>
               <a:t>Project 1</a:t>
-            </a:r>
-          </a:p>
-          <a:p>
-            <a:endParaRPr lang="en-US" dirty="0"/>
-          </a:p>
-          <a:p>
-            <a:r>
-              <a:rPr lang="en-US" dirty="0"/>
-              <a:t>Reading\Writing to files</a:t>
             </a:r>
           </a:p>
           <a:p>
@@ -3030,6 +3029,15 @@
             <a:r>
               <a:rPr lang="en-US" dirty="0"/>
               <a:t>Cursors!</a:t>
+            </a:r>
+          </a:p>
+          <a:p>
+            <a:endParaRPr lang="en-US" dirty="0"/>
+          </a:p>
+          <a:p>
+            <a:r>
+              <a:rPr lang="en-US" dirty="0"/>
+              <a:t>PyCharm</a:t>
             </a:r>
           </a:p>
           <a:p>
@@ -3044,98 +3052,6 @@
     <p:extLst>
       <p:ext uri="{BB962C8B-B14F-4D97-AF65-F5344CB8AC3E}">
         <p14:creationId xmlns:p14="http://schemas.microsoft.com/office/powerpoint/2010/main" val="3683477000"/>
-      </p:ext>
-    </p:extLst>
-  </p:cSld>
-  <p:clrMapOvr>
-    <a:masterClrMapping/>
-  </p:clrMapOvr>
-</p:sld>
-</file>
-
-<file path=ppt/slides/slide10.xml><?xml version="1.0" encoding="utf-8"?>
-<p:sld xmlns:a="http://schemas.openxmlformats.org/drawingml/2006/main" xmlns:r="http://schemas.openxmlformats.org/officeDocument/2006/relationships" xmlns:p="http://schemas.openxmlformats.org/presentationml/2006/main">
-  <p:cSld>
-    <p:spTree>
-      <p:nvGrpSpPr>
-        <p:cNvPr id="1" name=""/>
-        <p:cNvGrpSpPr/>
-        <p:nvPr/>
-      </p:nvGrpSpPr>
-      <p:grpSpPr>
-        <a:xfrm>
-          <a:off x="0" y="0"/>
-          <a:ext cx="0" cy="0"/>
-          <a:chOff x="0" y="0"/>
-          <a:chExt cx="0" cy="0"/>
-        </a:xfrm>
-      </p:grpSpPr>
-      <p:sp>
-        <p:nvSpPr>
-          <p:cNvPr id="2" name="Title 1"/>
-          <p:cNvSpPr>
-            <a:spLocks noGrp="1"/>
-          </p:cNvSpPr>
-          <p:nvPr>
-            <p:ph type="title"/>
-          </p:nvPr>
-        </p:nvSpPr>
-        <p:spPr/>
-        <p:txBody>
-          <a:bodyPr/>
-          <a:lstStyle/>
-          <a:p>
-            <a:r>
-              <a:rPr lang="en-US" dirty="0"/>
-              <a:t>Next Week (Week 6)</a:t>
-            </a:r>
-          </a:p>
-        </p:txBody>
-      </p:sp>
-      <p:sp>
-        <p:nvSpPr>
-          <p:cNvPr id="3" name="Content Placeholder 2"/>
-          <p:cNvSpPr>
-            <a:spLocks noGrp="1"/>
-          </p:cNvSpPr>
-          <p:nvPr>
-            <p:ph idx="1"/>
-          </p:nvPr>
-        </p:nvSpPr>
-        <p:spPr/>
-        <p:txBody>
-          <a:bodyPr/>
-          <a:lstStyle/>
-          <a:p>
-            <a:r>
-              <a:rPr lang="en-US" dirty="0"/>
-              <a:t>We will cover Geometries.</a:t>
-            </a:r>
-          </a:p>
-          <a:p>
-            <a:endParaRPr lang="en-US" dirty="0"/>
-          </a:p>
-          <a:p>
-            <a:r>
-              <a:rPr lang="en-US" dirty="0"/>
-              <a:t>Project 1 is posted and is due on February 25</a:t>
-            </a:r>
-          </a:p>
-          <a:p>
-            <a:endParaRPr lang="en-US" dirty="0"/>
-          </a:p>
-          <a:p>
-            <a:pPr marL="0" indent="0">
-              <a:buNone/>
-            </a:pPr>
-            <a:endParaRPr lang="en-US" dirty="0"/>
-          </a:p>
-        </p:txBody>
-      </p:sp>
-    </p:spTree>
-    <p:extLst>
-      <p:ext uri="{BB962C8B-B14F-4D97-AF65-F5344CB8AC3E}">
-        <p14:creationId xmlns:p14="http://schemas.microsoft.com/office/powerpoint/2010/main" val="2135447364"/>
       </p:ext>
     </p:extLst>
   </p:cSld>

</xml_diff>